<commit_message>
updated file section and added some images
</commit_message>
<xml_diff>
--- a/r-project-mgmt-repro/nih-r-project-mgmt-training-material/nihl-r-project-mgmt.pptx
+++ b/r-project-mgmt-repro/nih-r-project-mgmt-training-material/nihl-r-project-mgmt.pptx
@@ -6,7 +6,7 @@
     <p:sldMasterId id="2147483669" r:id="rId5"/>
   </p:sldMasterIdLst>
   <p:notesMasterIdLst>
-    <p:notesMasterId r:id="rId18"/>
+    <p:notesMasterId r:id="rId25"/>
   </p:notesMasterIdLst>
   <p:sldIdLst>
     <p:sldId id="275" r:id="rId6"/>
@@ -18,9 +18,16 @@
     <p:sldId id="272" r:id="rId12"/>
     <p:sldId id="273" r:id="rId13"/>
     <p:sldId id="274" r:id="rId14"/>
-    <p:sldId id="268" r:id="rId15"/>
-    <p:sldId id="263" r:id="rId16"/>
-    <p:sldId id="261" r:id="rId17"/>
+    <p:sldId id="276" r:id="rId15"/>
+    <p:sldId id="277" r:id="rId16"/>
+    <p:sldId id="278" r:id="rId17"/>
+    <p:sldId id="279" r:id="rId18"/>
+    <p:sldId id="280" r:id="rId19"/>
+    <p:sldId id="281" r:id="rId20"/>
+    <p:sldId id="282" r:id="rId21"/>
+    <p:sldId id="268" r:id="rId22"/>
+    <p:sldId id="263" r:id="rId23"/>
+    <p:sldId id="261" r:id="rId24"/>
   </p:sldIdLst>
   <p:sldSz cx="12192000" cy="6858000"/>
   <p:notesSz cx="6858000" cy="9144000"/>
@@ -549,7 +556,7 @@
           <a:p>
             <a:fld id="{4A4B1717-F3D4-4537-98D9-2D53D2FEF0EC}" type="slidenum">
               <a:rPr lang="en-US" smtClean="0"/>
-              <a:t>10</a:t>
+              <a:t>17</a:t>
             </a:fld>
             <a:endParaRPr lang="en-US"/>
           </a:p>
@@ -5654,6 +5661,941 @@
           <p:cNvPr id="2" name="Title 1">
             <a:extLst>
               <a:ext uri="{FF2B5EF4-FFF2-40B4-BE49-F238E27FC236}">
+                <a16:creationId xmlns:a16="http://schemas.microsoft.com/office/drawing/2014/main" id="{2369109C-8A22-D19C-F5D3-86764FA346DF}"/>
+              </a:ext>
+            </a:extLst>
+          </p:cNvPr>
+          <p:cNvSpPr>
+            <a:spLocks noGrp="1"/>
+          </p:cNvSpPr>
+          <p:nvPr>
+            <p:ph type="title"/>
+          </p:nvPr>
+        </p:nvSpPr>
+        <p:spPr/>
+        <p:txBody>
+          <a:bodyPr/>
+          <a:lstStyle/>
+          <a:p>
+            <a:r>
+              <a:rPr lang="en-US" dirty="0"/>
+              <a:t>Files and folders</a:t>
+            </a:r>
+          </a:p>
+        </p:txBody>
+      </p:sp>
+      <p:sp>
+        <p:nvSpPr>
+          <p:cNvPr id="3" name="Content Placeholder 2">
+            <a:extLst>
+              <a:ext uri="{FF2B5EF4-FFF2-40B4-BE49-F238E27FC236}">
+                <a16:creationId xmlns:a16="http://schemas.microsoft.com/office/drawing/2014/main" id="{B406F852-C5CF-9222-E550-D4A6564BDBDC}"/>
+              </a:ext>
+            </a:extLst>
+          </p:cNvPr>
+          <p:cNvSpPr>
+            <a:spLocks noGrp="1"/>
+          </p:cNvSpPr>
+          <p:nvPr>
+            <p:ph sz="half" idx="1"/>
+          </p:nvPr>
+        </p:nvSpPr>
+        <p:spPr/>
+        <p:txBody>
+          <a:bodyPr/>
+          <a:lstStyle/>
+          <a:p>
+            <a:r>
+              <a:rPr lang="en-US" dirty="0"/>
+              <a:t>Using the chat, list some problems that you have encountered when dealing with files and folders?</a:t>
+            </a:r>
+          </a:p>
+        </p:txBody>
+      </p:sp>
+      <p:pic>
+        <p:nvPicPr>
+          <p:cNvPr id="6" name="Content Placeholder 5">
+            <a:extLst>
+              <a:ext uri="{FF2B5EF4-FFF2-40B4-BE49-F238E27FC236}">
+                <a16:creationId xmlns:a16="http://schemas.microsoft.com/office/drawing/2014/main" id="{18203F23-8C76-0562-FB85-AF014FF5221D}"/>
+              </a:ext>
+            </a:extLst>
+          </p:cNvPr>
+          <p:cNvPicPr>
+            <a:picLocks noGrp="1" noChangeAspect="1"/>
+          </p:cNvPicPr>
+          <p:nvPr>
+            <p:ph sz="half" idx="2"/>
+          </p:nvPr>
+        </p:nvPicPr>
+        <p:blipFill>
+          <a:blip r:embed="rId2">
+            <a:duotone>
+              <a:prstClr val="black"/>
+              <a:schemeClr val="tx2">
+                <a:tint val="45000"/>
+                <a:satMod val="400000"/>
+              </a:schemeClr>
+            </a:duotone>
+            <a:extLst>
+              <a:ext uri="{28A0092B-C50C-407E-A947-70E740481C1C}">
+                <a14:useLocalDpi xmlns:a14="http://schemas.microsoft.com/office/drawing/2010/main" val="0"/>
+              </a:ext>
+            </a:extLst>
+          </a:blip>
+          <a:stretch>
+            <a:fillRect/>
+          </a:stretch>
+        </p:blipFill>
+        <p:spPr>
+          <a:xfrm>
+            <a:off x="6443662" y="1143000"/>
+            <a:ext cx="4892675" cy="4892675"/>
+          </a:xfrm>
+        </p:spPr>
+      </p:pic>
+    </p:spTree>
+    <p:extLst>
+      <p:ext uri="{BB962C8B-B14F-4D97-AF65-F5344CB8AC3E}">
+        <p14:creationId xmlns:p14="http://schemas.microsoft.com/office/powerpoint/2010/main" val="741056902"/>
+      </p:ext>
+    </p:extLst>
+  </p:cSld>
+  <p:clrMapOvr>
+    <a:masterClrMapping/>
+  </p:clrMapOvr>
+</p:sld>
+</file>
+
+<file path=ppt/slides/slide11.xml><?xml version="1.0" encoding="utf-8"?>
+<p:sld xmlns:a="http://schemas.openxmlformats.org/drawingml/2006/main" xmlns:r="http://schemas.openxmlformats.org/officeDocument/2006/relationships" xmlns:p="http://schemas.openxmlformats.org/presentationml/2006/main">
+  <p:cSld>
+    <p:spTree>
+      <p:nvGrpSpPr>
+        <p:cNvPr id="1" name=""/>
+        <p:cNvGrpSpPr/>
+        <p:nvPr/>
+      </p:nvGrpSpPr>
+      <p:grpSpPr>
+        <a:xfrm>
+          <a:off x="0" y="0"/>
+          <a:ext cx="0" cy="0"/>
+          <a:chOff x="0" y="0"/>
+          <a:chExt cx="0" cy="0"/>
+        </a:xfrm>
+      </p:grpSpPr>
+      <p:sp>
+        <p:nvSpPr>
+          <p:cNvPr id="2" name="Title 1">
+            <a:extLst>
+              <a:ext uri="{FF2B5EF4-FFF2-40B4-BE49-F238E27FC236}">
+                <a16:creationId xmlns:a16="http://schemas.microsoft.com/office/drawing/2014/main" id="{2369109C-8A22-D19C-F5D3-86764FA346DF}"/>
+              </a:ext>
+            </a:extLst>
+          </p:cNvPr>
+          <p:cNvSpPr>
+            <a:spLocks noGrp="1"/>
+          </p:cNvSpPr>
+          <p:nvPr>
+            <p:ph type="title"/>
+          </p:nvPr>
+        </p:nvSpPr>
+        <p:spPr/>
+        <p:txBody>
+          <a:bodyPr/>
+          <a:lstStyle/>
+          <a:p>
+            <a:r>
+              <a:rPr lang="en-US" dirty="0"/>
+              <a:t>Files and folders</a:t>
+            </a:r>
+          </a:p>
+        </p:txBody>
+      </p:sp>
+      <p:sp>
+        <p:nvSpPr>
+          <p:cNvPr id="3" name="Content Placeholder 2">
+            <a:extLst>
+              <a:ext uri="{FF2B5EF4-FFF2-40B4-BE49-F238E27FC236}">
+                <a16:creationId xmlns:a16="http://schemas.microsoft.com/office/drawing/2014/main" id="{B406F852-C5CF-9222-E550-D4A6564BDBDC}"/>
+              </a:ext>
+            </a:extLst>
+          </p:cNvPr>
+          <p:cNvSpPr>
+            <a:spLocks noGrp="1"/>
+          </p:cNvSpPr>
+          <p:nvPr>
+            <p:ph sz="half" idx="1"/>
+          </p:nvPr>
+        </p:nvSpPr>
+        <p:spPr/>
+        <p:txBody>
+          <a:bodyPr>
+            <a:normAutofit lnSpcReduction="10000"/>
+          </a:bodyPr>
+          <a:lstStyle/>
+          <a:p>
+            <a:r>
+              <a:rPr lang="en-US" dirty="0"/>
+              <a:t>Cannot find your files on your computer (or your cloud storage)</a:t>
+            </a:r>
+          </a:p>
+          <a:p>
+            <a:r>
+              <a:rPr lang="en-US" dirty="0"/>
+              <a:t>Multiple versions of files with names such as "finaldraft_4.txt”</a:t>
+            </a:r>
+          </a:p>
+          <a:p>
+            <a:r>
+              <a:rPr lang="en-US" dirty="0"/>
+              <a:t>Path issues when trying to run code</a:t>
+            </a:r>
+          </a:p>
+          <a:p>
+            <a:r>
+              <a:rPr lang="en-US" dirty="0"/>
+              <a:t>Reviewers or colleagues cannot re-run your code/analyses</a:t>
+            </a:r>
+          </a:p>
+        </p:txBody>
+      </p:sp>
+      <p:pic>
+        <p:nvPicPr>
+          <p:cNvPr id="6" name="Content Placeholder 5">
+            <a:extLst>
+              <a:ext uri="{FF2B5EF4-FFF2-40B4-BE49-F238E27FC236}">
+                <a16:creationId xmlns:a16="http://schemas.microsoft.com/office/drawing/2014/main" id="{18203F23-8C76-0562-FB85-AF014FF5221D}"/>
+              </a:ext>
+            </a:extLst>
+          </p:cNvPr>
+          <p:cNvPicPr>
+            <a:picLocks noGrp="1" noChangeAspect="1"/>
+          </p:cNvPicPr>
+          <p:nvPr>
+            <p:ph sz="half" idx="2"/>
+          </p:nvPr>
+        </p:nvPicPr>
+        <p:blipFill>
+          <a:blip r:embed="rId2">
+            <a:duotone>
+              <a:prstClr val="black"/>
+              <a:schemeClr val="tx2">
+                <a:tint val="45000"/>
+                <a:satMod val="400000"/>
+              </a:schemeClr>
+            </a:duotone>
+            <a:extLst>
+              <a:ext uri="{28A0092B-C50C-407E-A947-70E740481C1C}">
+                <a14:useLocalDpi xmlns:a14="http://schemas.microsoft.com/office/drawing/2010/main" val="0"/>
+              </a:ext>
+            </a:extLst>
+          </a:blip>
+          <a:stretch>
+            <a:fillRect/>
+          </a:stretch>
+        </p:blipFill>
+        <p:spPr>
+          <a:xfrm>
+            <a:off x="6443662" y="1143000"/>
+            <a:ext cx="4892675" cy="4892675"/>
+          </a:xfrm>
+        </p:spPr>
+      </p:pic>
+    </p:spTree>
+    <p:extLst>
+      <p:ext uri="{BB962C8B-B14F-4D97-AF65-F5344CB8AC3E}">
+        <p14:creationId xmlns:p14="http://schemas.microsoft.com/office/powerpoint/2010/main" val="3421354935"/>
+      </p:ext>
+    </p:extLst>
+  </p:cSld>
+  <p:clrMapOvr>
+    <a:masterClrMapping/>
+  </p:clrMapOvr>
+</p:sld>
+</file>
+
+<file path=ppt/slides/slide12.xml><?xml version="1.0" encoding="utf-8"?>
+<p:sld xmlns:a="http://schemas.openxmlformats.org/drawingml/2006/main" xmlns:r="http://schemas.openxmlformats.org/officeDocument/2006/relationships" xmlns:p="http://schemas.openxmlformats.org/presentationml/2006/main">
+  <p:cSld>
+    <p:spTree>
+      <p:nvGrpSpPr>
+        <p:cNvPr id="1" name=""/>
+        <p:cNvGrpSpPr/>
+        <p:nvPr/>
+      </p:nvGrpSpPr>
+      <p:grpSpPr>
+        <a:xfrm>
+          <a:off x="0" y="0"/>
+          <a:ext cx="0" cy="0"/>
+          <a:chOff x="0" y="0"/>
+          <a:chExt cx="0" cy="0"/>
+        </a:xfrm>
+      </p:grpSpPr>
+      <p:sp>
+        <p:nvSpPr>
+          <p:cNvPr id="2" name="Title 1">
+            <a:extLst>
+              <a:ext uri="{FF2B5EF4-FFF2-40B4-BE49-F238E27FC236}">
+                <a16:creationId xmlns:a16="http://schemas.microsoft.com/office/drawing/2014/main" id="{2369109C-8A22-D19C-F5D3-86764FA346DF}"/>
+              </a:ext>
+            </a:extLst>
+          </p:cNvPr>
+          <p:cNvSpPr>
+            <a:spLocks noGrp="1"/>
+          </p:cNvSpPr>
+          <p:nvPr>
+            <p:ph type="title"/>
+          </p:nvPr>
+        </p:nvSpPr>
+        <p:spPr/>
+        <p:txBody>
+          <a:bodyPr/>
+          <a:lstStyle/>
+          <a:p>
+            <a:r>
+              <a:rPr lang="en-US" dirty="0"/>
+              <a:t>Storage and Sharing Issues</a:t>
+            </a:r>
+          </a:p>
+        </p:txBody>
+      </p:sp>
+      <p:sp>
+        <p:nvSpPr>
+          <p:cNvPr id="3" name="Content Placeholder 2">
+            <a:extLst>
+              <a:ext uri="{FF2B5EF4-FFF2-40B4-BE49-F238E27FC236}">
+                <a16:creationId xmlns:a16="http://schemas.microsoft.com/office/drawing/2014/main" id="{B406F852-C5CF-9222-E550-D4A6564BDBDC}"/>
+              </a:ext>
+            </a:extLst>
+          </p:cNvPr>
+          <p:cNvSpPr>
+            <a:spLocks noGrp="1"/>
+          </p:cNvSpPr>
+          <p:nvPr>
+            <p:ph sz="half" idx="1"/>
+          </p:nvPr>
+        </p:nvSpPr>
+        <p:spPr/>
+        <p:txBody>
+          <a:bodyPr/>
+          <a:lstStyle/>
+          <a:p>
+            <a:r>
+              <a:rPr lang="en-US" dirty="0"/>
+              <a:t>Using the chat, list some problems that you have encountered when dealing with storage or sharing?</a:t>
+            </a:r>
+          </a:p>
+        </p:txBody>
+      </p:sp>
+      <p:pic>
+        <p:nvPicPr>
+          <p:cNvPr id="6" name="Content Placeholder 5">
+            <a:extLst>
+              <a:ext uri="{FF2B5EF4-FFF2-40B4-BE49-F238E27FC236}">
+                <a16:creationId xmlns:a16="http://schemas.microsoft.com/office/drawing/2014/main" id="{18203F23-8C76-0562-FB85-AF014FF5221D}"/>
+              </a:ext>
+            </a:extLst>
+          </p:cNvPr>
+          <p:cNvPicPr>
+            <a:picLocks noGrp="1" noChangeAspect="1"/>
+          </p:cNvPicPr>
+          <p:nvPr>
+            <p:ph sz="half" idx="2"/>
+          </p:nvPr>
+        </p:nvPicPr>
+        <p:blipFill>
+          <a:blip r:embed="rId2">
+            <a:extLst>
+              <a:ext uri="{28A0092B-C50C-407E-A947-70E740481C1C}">
+                <a14:useLocalDpi xmlns:a14="http://schemas.microsoft.com/office/drawing/2010/main" val="0"/>
+              </a:ext>
+            </a:extLst>
+          </a:blip>
+          <a:srcRect/>
+          <a:stretch/>
+        </p:blipFill>
+        <p:spPr>
+          <a:xfrm>
+            <a:off x="6443662" y="1143000"/>
+            <a:ext cx="4892675" cy="4892675"/>
+          </a:xfrm>
+        </p:spPr>
+      </p:pic>
+    </p:spTree>
+    <p:extLst>
+      <p:ext uri="{BB962C8B-B14F-4D97-AF65-F5344CB8AC3E}">
+        <p14:creationId xmlns:p14="http://schemas.microsoft.com/office/powerpoint/2010/main" val="3685717769"/>
+      </p:ext>
+    </p:extLst>
+  </p:cSld>
+  <p:clrMapOvr>
+    <a:masterClrMapping/>
+  </p:clrMapOvr>
+</p:sld>
+</file>
+
+<file path=ppt/slides/slide13.xml><?xml version="1.0" encoding="utf-8"?>
+<p:sld xmlns:a="http://schemas.openxmlformats.org/drawingml/2006/main" xmlns:r="http://schemas.openxmlformats.org/officeDocument/2006/relationships" xmlns:p="http://schemas.openxmlformats.org/presentationml/2006/main">
+  <p:cSld>
+    <p:spTree>
+      <p:nvGrpSpPr>
+        <p:cNvPr id="1" name=""/>
+        <p:cNvGrpSpPr/>
+        <p:nvPr/>
+      </p:nvGrpSpPr>
+      <p:grpSpPr>
+        <a:xfrm>
+          <a:off x="0" y="0"/>
+          <a:ext cx="0" cy="0"/>
+          <a:chOff x="0" y="0"/>
+          <a:chExt cx="0" cy="0"/>
+        </a:xfrm>
+      </p:grpSpPr>
+      <p:sp>
+        <p:nvSpPr>
+          <p:cNvPr id="2" name="Title 1">
+            <a:extLst>
+              <a:ext uri="{FF2B5EF4-FFF2-40B4-BE49-F238E27FC236}">
+                <a16:creationId xmlns:a16="http://schemas.microsoft.com/office/drawing/2014/main" id="{2369109C-8A22-D19C-F5D3-86764FA346DF}"/>
+              </a:ext>
+            </a:extLst>
+          </p:cNvPr>
+          <p:cNvSpPr>
+            <a:spLocks noGrp="1"/>
+          </p:cNvSpPr>
+          <p:nvPr>
+            <p:ph type="title"/>
+          </p:nvPr>
+        </p:nvSpPr>
+        <p:spPr/>
+        <p:txBody>
+          <a:bodyPr/>
+          <a:lstStyle/>
+          <a:p>
+            <a:r>
+              <a:rPr lang="en-US" dirty="0"/>
+              <a:t>Storage and Sharing Issues</a:t>
+            </a:r>
+          </a:p>
+        </p:txBody>
+      </p:sp>
+      <p:sp>
+        <p:nvSpPr>
+          <p:cNvPr id="3" name="Content Placeholder 2">
+            <a:extLst>
+              <a:ext uri="{FF2B5EF4-FFF2-40B4-BE49-F238E27FC236}">
+                <a16:creationId xmlns:a16="http://schemas.microsoft.com/office/drawing/2014/main" id="{B406F852-C5CF-9222-E550-D4A6564BDBDC}"/>
+              </a:ext>
+            </a:extLst>
+          </p:cNvPr>
+          <p:cNvSpPr>
+            <a:spLocks noGrp="1"/>
+          </p:cNvSpPr>
+          <p:nvPr>
+            <p:ph sz="half" idx="1"/>
+          </p:nvPr>
+        </p:nvSpPr>
+        <p:spPr/>
+        <p:txBody>
+          <a:bodyPr>
+            <a:normAutofit/>
+          </a:bodyPr>
+          <a:lstStyle/>
+          <a:p>
+            <a:r>
+              <a:rPr lang="en-US" dirty="0"/>
+              <a:t>Files are only saved to your computer</a:t>
+            </a:r>
+          </a:p>
+          <a:p>
+            <a:r>
+              <a:rPr lang="en-US" dirty="0"/>
+              <a:t>Collaborators don't share the files needed</a:t>
+            </a:r>
+          </a:p>
+          <a:p>
+            <a:r>
+              <a:rPr lang="en-US" dirty="0"/>
+              <a:t>Files are shared via email attachments</a:t>
+            </a:r>
+          </a:p>
+          <a:p>
+            <a:r>
+              <a:rPr lang="en-US" dirty="0"/>
+              <a:t>Difficult to know if you have the latest version of documents</a:t>
+            </a:r>
+          </a:p>
+        </p:txBody>
+      </p:sp>
+      <p:pic>
+        <p:nvPicPr>
+          <p:cNvPr id="6" name="Content Placeholder 5">
+            <a:extLst>
+              <a:ext uri="{FF2B5EF4-FFF2-40B4-BE49-F238E27FC236}">
+                <a16:creationId xmlns:a16="http://schemas.microsoft.com/office/drawing/2014/main" id="{18203F23-8C76-0562-FB85-AF014FF5221D}"/>
+              </a:ext>
+            </a:extLst>
+          </p:cNvPr>
+          <p:cNvPicPr>
+            <a:picLocks noGrp="1" noChangeAspect="1"/>
+          </p:cNvPicPr>
+          <p:nvPr>
+            <p:ph sz="half" idx="2"/>
+          </p:nvPr>
+        </p:nvPicPr>
+        <p:blipFill>
+          <a:blip r:embed="rId2">
+            <a:extLst>
+              <a:ext uri="{28A0092B-C50C-407E-A947-70E740481C1C}">
+                <a14:useLocalDpi xmlns:a14="http://schemas.microsoft.com/office/drawing/2010/main" val="0"/>
+              </a:ext>
+            </a:extLst>
+          </a:blip>
+          <a:srcRect/>
+          <a:stretch/>
+        </p:blipFill>
+        <p:spPr>
+          <a:xfrm>
+            <a:off x="6443662" y="1143000"/>
+            <a:ext cx="4892675" cy="4892675"/>
+          </a:xfrm>
+        </p:spPr>
+      </p:pic>
+    </p:spTree>
+    <p:extLst>
+      <p:ext uri="{BB962C8B-B14F-4D97-AF65-F5344CB8AC3E}">
+        <p14:creationId xmlns:p14="http://schemas.microsoft.com/office/powerpoint/2010/main" val="1438035200"/>
+      </p:ext>
+    </p:extLst>
+  </p:cSld>
+  <p:clrMapOvr>
+    <a:masterClrMapping/>
+  </p:clrMapOvr>
+</p:sld>
+</file>
+
+<file path=ppt/slides/slide14.xml><?xml version="1.0" encoding="utf-8"?>
+<p:sld xmlns:a="http://schemas.openxmlformats.org/drawingml/2006/main" xmlns:r="http://schemas.openxmlformats.org/officeDocument/2006/relationships" xmlns:p="http://schemas.openxmlformats.org/presentationml/2006/main">
+  <p:cSld>
+    <p:spTree>
+      <p:nvGrpSpPr>
+        <p:cNvPr id="1" name=""/>
+        <p:cNvGrpSpPr/>
+        <p:nvPr/>
+      </p:nvGrpSpPr>
+      <p:grpSpPr>
+        <a:xfrm>
+          <a:off x="0" y="0"/>
+          <a:ext cx="0" cy="0"/>
+          <a:chOff x="0" y="0"/>
+          <a:chExt cx="0" cy="0"/>
+        </a:xfrm>
+      </p:grpSpPr>
+      <p:sp>
+        <p:nvSpPr>
+          <p:cNvPr id="2" name="Title 1">
+            <a:extLst>
+              <a:ext uri="{FF2B5EF4-FFF2-40B4-BE49-F238E27FC236}">
+                <a16:creationId xmlns:a16="http://schemas.microsoft.com/office/drawing/2014/main" id="{249E2E84-486A-BDD4-BEC1-F2BA997B4A1C}"/>
+              </a:ext>
+            </a:extLst>
+          </p:cNvPr>
+          <p:cNvSpPr>
+            <a:spLocks noGrp="1"/>
+          </p:cNvSpPr>
+          <p:nvPr>
+            <p:ph type="title"/>
+          </p:nvPr>
+        </p:nvSpPr>
+        <p:spPr/>
+        <p:txBody>
+          <a:bodyPr/>
+          <a:lstStyle/>
+          <a:p>
+            <a:r>
+              <a:rPr lang="en-US" dirty="0"/>
+              <a:t>Practice Good File Organization</a:t>
+            </a:r>
+          </a:p>
+        </p:txBody>
+      </p:sp>
+      <p:sp>
+        <p:nvSpPr>
+          <p:cNvPr id="3" name="Content Placeholder 2">
+            <a:extLst>
+              <a:ext uri="{FF2B5EF4-FFF2-40B4-BE49-F238E27FC236}">
+                <a16:creationId xmlns:a16="http://schemas.microsoft.com/office/drawing/2014/main" id="{C89D2DDD-46D8-D857-AD22-435640ACEFB8}"/>
+              </a:ext>
+            </a:extLst>
+          </p:cNvPr>
+          <p:cNvSpPr>
+            <a:spLocks noGrp="1"/>
+          </p:cNvSpPr>
+          <p:nvPr>
+            <p:ph idx="1"/>
+          </p:nvPr>
+        </p:nvSpPr>
+        <p:spPr/>
+        <p:txBody>
+          <a:bodyPr>
+            <a:normAutofit/>
+          </a:bodyPr>
+          <a:lstStyle/>
+          <a:p>
+            <a:r>
+              <a:rPr lang="en-US" dirty="0">
+                <a:hlinkClick r:id="rId2"/>
+              </a:rPr>
+              <a:t>Good Enough Practices for Scientific Computing</a:t>
+            </a:r>
+            <a:r>
+              <a:rPr lang="en-US" dirty="0"/>
+              <a:t> gives the following recommendations for project organization:</a:t>
+            </a:r>
+          </a:p>
+          <a:p>
+            <a:pPr lvl="1"/>
+            <a:r>
+              <a:rPr lang="en-US" dirty="0"/>
+              <a:t>Each project in its own directory, which is named after the project</a:t>
+            </a:r>
+          </a:p>
+          <a:p>
+            <a:pPr lvl="1"/>
+            <a:r>
+              <a:rPr lang="en-US" dirty="0"/>
+              <a:t>Text documents associated with the project in the doc directory</a:t>
+            </a:r>
+          </a:p>
+          <a:p>
+            <a:pPr lvl="1"/>
+            <a:r>
+              <a:rPr lang="en-US" dirty="0"/>
+              <a:t>Raw data and metadata in the data directory (raw-data)</a:t>
+            </a:r>
+          </a:p>
+          <a:p>
+            <a:pPr lvl="1"/>
+            <a:r>
+              <a:rPr lang="en-US" dirty="0"/>
+              <a:t>Files generated during cleanup and analysis in a results directory</a:t>
+            </a:r>
+          </a:p>
+        </p:txBody>
+      </p:sp>
+    </p:spTree>
+    <p:extLst>
+      <p:ext uri="{BB962C8B-B14F-4D97-AF65-F5344CB8AC3E}">
+        <p14:creationId xmlns:p14="http://schemas.microsoft.com/office/powerpoint/2010/main" val="3031811970"/>
+      </p:ext>
+    </p:extLst>
+  </p:cSld>
+  <p:clrMapOvr>
+    <a:masterClrMapping/>
+  </p:clrMapOvr>
+</p:sld>
+</file>
+
+<file path=ppt/slides/slide15.xml><?xml version="1.0" encoding="utf-8"?>
+<p:sld xmlns:a="http://schemas.openxmlformats.org/drawingml/2006/main" xmlns:r="http://schemas.openxmlformats.org/officeDocument/2006/relationships" xmlns:p="http://schemas.openxmlformats.org/presentationml/2006/main">
+  <p:cSld>
+    <p:spTree>
+      <p:nvGrpSpPr>
+        <p:cNvPr id="1" name=""/>
+        <p:cNvGrpSpPr/>
+        <p:nvPr/>
+      </p:nvGrpSpPr>
+      <p:grpSpPr>
+        <a:xfrm>
+          <a:off x="0" y="0"/>
+          <a:ext cx="0" cy="0"/>
+          <a:chOff x="0" y="0"/>
+          <a:chExt cx="0" cy="0"/>
+        </a:xfrm>
+      </p:grpSpPr>
+      <p:sp>
+        <p:nvSpPr>
+          <p:cNvPr id="2" name="Title 1">
+            <a:extLst>
+              <a:ext uri="{FF2B5EF4-FFF2-40B4-BE49-F238E27FC236}">
+                <a16:creationId xmlns:a16="http://schemas.microsoft.com/office/drawing/2014/main" id="{249E2E84-486A-BDD4-BEC1-F2BA997B4A1C}"/>
+              </a:ext>
+            </a:extLst>
+          </p:cNvPr>
+          <p:cNvSpPr>
+            <a:spLocks noGrp="1"/>
+          </p:cNvSpPr>
+          <p:nvPr>
+            <p:ph type="title"/>
+          </p:nvPr>
+        </p:nvSpPr>
+        <p:spPr/>
+        <p:txBody>
+          <a:bodyPr/>
+          <a:lstStyle/>
+          <a:p>
+            <a:r>
+              <a:rPr lang="en-US" dirty="0"/>
+              <a:t>Practice Good File Organization</a:t>
+            </a:r>
+          </a:p>
+        </p:txBody>
+      </p:sp>
+      <p:sp>
+        <p:nvSpPr>
+          <p:cNvPr id="3" name="Content Placeholder 2">
+            <a:extLst>
+              <a:ext uri="{FF2B5EF4-FFF2-40B4-BE49-F238E27FC236}">
+                <a16:creationId xmlns:a16="http://schemas.microsoft.com/office/drawing/2014/main" id="{C89D2DDD-46D8-D857-AD22-435640ACEFB8}"/>
+              </a:ext>
+            </a:extLst>
+          </p:cNvPr>
+          <p:cNvSpPr>
+            <a:spLocks noGrp="1"/>
+          </p:cNvSpPr>
+          <p:nvPr>
+            <p:ph idx="1"/>
+          </p:nvPr>
+        </p:nvSpPr>
+        <p:spPr/>
+        <p:txBody>
+          <a:bodyPr>
+            <a:normAutofit/>
+          </a:bodyPr>
+          <a:lstStyle/>
+          <a:p>
+            <a:r>
+              <a:rPr lang="en-US" dirty="0">
+                <a:hlinkClick r:id="rId2"/>
+              </a:rPr>
+              <a:t>Good Enough Practices for Scientific Computing</a:t>
+            </a:r>
+            <a:r>
+              <a:rPr lang="en-US" dirty="0"/>
+              <a:t> gives the following recommendations for project organization:</a:t>
+            </a:r>
+          </a:p>
+          <a:p>
+            <a:pPr lvl="1"/>
+            <a:r>
+              <a:rPr lang="en-US" dirty="0"/>
+              <a:t>Project's scripts and programs in the </a:t>
+            </a:r>
+            <a:r>
+              <a:rPr lang="en-US" dirty="0" err="1"/>
+              <a:t>src</a:t>
+            </a:r>
+            <a:r>
+              <a:rPr lang="en-US" dirty="0"/>
+              <a:t> directory</a:t>
+            </a:r>
+          </a:p>
+          <a:p>
+            <a:pPr lvl="1"/>
+            <a:r>
+              <a:rPr lang="en-US" dirty="0"/>
+              <a:t>Programs brought in from elsewhere or compiled locally in the bin directory</a:t>
+            </a:r>
+          </a:p>
+          <a:p>
+            <a:pPr lvl="1"/>
+            <a:r>
+              <a:rPr lang="en-US" dirty="0"/>
+              <a:t>Name all files to reflect their content or function</a:t>
+            </a:r>
+          </a:p>
+          <a:p>
+            <a:pPr lvl="1"/>
+            <a:r>
+              <a:rPr lang="en-US" dirty="0"/>
+              <a:t>README file to a repository to communicate important information about your project</a:t>
+            </a:r>
+          </a:p>
+          <a:p>
+            <a:pPr lvl="1"/>
+            <a:r>
+              <a:rPr lang="en-US" dirty="0" err="1"/>
+              <a:t>CITATION.cff</a:t>
+            </a:r>
+            <a:r>
+              <a:rPr lang="en-US" dirty="0"/>
+              <a:t> file to the root of a repository to let others know how you would like them to cite your work</a:t>
+            </a:r>
+          </a:p>
+        </p:txBody>
+      </p:sp>
+    </p:spTree>
+    <p:extLst>
+      <p:ext uri="{BB962C8B-B14F-4D97-AF65-F5344CB8AC3E}">
+        <p14:creationId xmlns:p14="http://schemas.microsoft.com/office/powerpoint/2010/main" val="1853473135"/>
+      </p:ext>
+    </p:extLst>
+  </p:cSld>
+  <p:clrMapOvr>
+    <a:masterClrMapping/>
+  </p:clrMapOvr>
+</p:sld>
+</file>
+
+<file path=ppt/slides/slide16.xml><?xml version="1.0" encoding="utf-8"?>
+<p:sld xmlns:a="http://schemas.openxmlformats.org/drawingml/2006/main" xmlns:r="http://schemas.openxmlformats.org/officeDocument/2006/relationships" xmlns:p="http://schemas.openxmlformats.org/presentationml/2006/main">
+  <p:cSld>
+    <p:spTree>
+      <p:nvGrpSpPr>
+        <p:cNvPr id="1" name=""/>
+        <p:cNvGrpSpPr/>
+        <p:nvPr/>
+      </p:nvGrpSpPr>
+      <p:grpSpPr>
+        <a:xfrm>
+          <a:off x="0" y="0"/>
+          <a:ext cx="0" cy="0"/>
+          <a:chOff x="0" y="0"/>
+          <a:chExt cx="0" cy="0"/>
+        </a:xfrm>
+      </p:grpSpPr>
+      <p:sp>
+        <p:nvSpPr>
+          <p:cNvPr id="2" name="Title 1">
+            <a:extLst>
+              <a:ext uri="{FF2B5EF4-FFF2-40B4-BE49-F238E27FC236}">
+                <a16:creationId xmlns:a16="http://schemas.microsoft.com/office/drawing/2014/main" id="{249E2E84-486A-BDD4-BEC1-F2BA997B4A1C}"/>
+              </a:ext>
+            </a:extLst>
+          </p:cNvPr>
+          <p:cNvSpPr>
+            <a:spLocks noGrp="1"/>
+          </p:cNvSpPr>
+          <p:nvPr>
+            <p:ph type="title"/>
+          </p:nvPr>
+        </p:nvSpPr>
+        <p:spPr/>
+        <p:txBody>
+          <a:bodyPr/>
+          <a:lstStyle/>
+          <a:p>
+            <a:r>
+              <a:rPr lang="en-US" dirty="0"/>
+              <a:t>Practice Good File Organization</a:t>
+            </a:r>
+          </a:p>
+        </p:txBody>
+      </p:sp>
+      <p:sp>
+        <p:nvSpPr>
+          <p:cNvPr id="3" name="Content Placeholder 2">
+            <a:extLst>
+              <a:ext uri="{FF2B5EF4-FFF2-40B4-BE49-F238E27FC236}">
+                <a16:creationId xmlns:a16="http://schemas.microsoft.com/office/drawing/2014/main" id="{C89D2DDD-46D8-D857-AD22-435640ACEFB8}"/>
+              </a:ext>
+            </a:extLst>
+          </p:cNvPr>
+          <p:cNvSpPr>
+            <a:spLocks noGrp="1"/>
+          </p:cNvSpPr>
+          <p:nvPr>
+            <p:ph idx="1"/>
+          </p:nvPr>
+        </p:nvSpPr>
+        <p:spPr/>
+        <p:txBody>
+          <a:bodyPr>
+            <a:normAutofit/>
+          </a:bodyPr>
+          <a:lstStyle/>
+          <a:p>
+            <a:r>
+              <a:rPr lang="en-US" dirty="0"/>
+              <a:t>Additional filles to include:</a:t>
+            </a:r>
+          </a:p>
+          <a:p>
+            <a:pPr lvl="1"/>
+            <a:r>
+              <a:rPr lang="en-US" dirty="0">
+                <a:hlinkClick r:id="rId2"/>
+              </a:rPr>
+              <a:t>README file</a:t>
+            </a:r>
+            <a:r>
+              <a:rPr lang="en-US" dirty="0"/>
+              <a:t>, to communicate important information about your project</a:t>
+            </a:r>
+          </a:p>
+          <a:p>
+            <a:pPr lvl="1"/>
+            <a:r>
+              <a:rPr lang="en-US" dirty="0">
+                <a:hlinkClick r:id="rId3"/>
+              </a:rPr>
+              <a:t>LICENSE file</a:t>
+            </a:r>
+            <a:r>
+              <a:rPr lang="en-US" dirty="0"/>
+              <a:t>, so that others are free to use, change, and distribute the software</a:t>
+            </a:r>
+          </a:p>
+          <a:p>
+            <a:pPr lvl="1"/>
+            <a:r>
+              <a:rPr lang="en-US" dirty="0" err="1">
+                <a:hlinkClick r:id="rId4"/>
+              </a:rPr>
+              <a:t>CITATION.cff</a:t>
+            </a:r>
+            <a:r>
+              <a:rPr lang="en-US" dirty="0">
+                <a:hlinkClick r:id="rId4"/>
+              </a:rPr>
+              <a:t> file</a:t>
+            </a:r>
+            <a:r>
+              <a:rPr lang="en-US" dirty="0"/>
+              <a:t>, to let others know how you would like them to cite your work</a:t>
+            </a:r>
+          </a:p>
+          <a:p>
+            <a:endParaRPr lang="en-US" dirty="0"/>
+          </a:p>
+        </p:txBody>
+      </p:sp>
+    </p:spTree>
+    <p:extLst>
+      <p:ext uri="{BB962C8B-B14F-4D97-AF65-F5344CB8AC3E}">
+        <p14:creationId xmlns:p14="http://schemas.microsoft.com/office/powerpoint/2010/main" val="241347032"/>
+      </p:ext>
+    </p:extLst>
+  </p:cSld>
+  <p:clrMapOvr>
+    <a:masterClrMapping/>
+  </p:clrMapOvr>
+</p:sld>
+</file>
+
+<file path=ppt/slides/slide17.xml><?xml version="1.0" encoding="utf-8"?>
+<p:sld xmlns:a="http://schemas.openxmlformats.org/drawingml/2006/main" xmlns:r="http://schemas.openxmlformats.org/officeDocument/2006/relationships" xmlns:p="http://schemas.openxmlformats.org/presentationml/2006/main">
+  <p:cSld>
+    <p:spTree>
+      <p:nvGrpSpPr>
+        <p:cNvPr id="1" name=""/>
+        <p:cNvGrpSpPr/>
+        <p:nvPr/>
+      </p:nvGrpSpPr>
+      <p:grpSpPr>
+        <a:xfrm>
+          <a:off x="0" y="0"/>
+          <a:ext cx="0" cy="0"/>
+          <a:chOff x="0" y="0"/>
+          <a:chExt cx="0" cy="0"/>
+        </a:xfrm>
+      </p:grpSpPr>
+      <p:sp>
+        <p:nvSpPr>
+          <p:cNvPr id="2" name="Title 1">
+            <a:extLst>
+              <a:ext uri="{FF2B5EF4-FFF2-40B4-BE49-F238E27FC236}">
                 <a16:creationId xmlns:a16="http://schemas.microsoft.com/office/drawing/2014/main" id="{AFF13CDC-D101-4DA7-BDAA-7FFF00FD8541}"/>
               </a:ext>
             </a:extLst>
@@ -6095,7 +7037,7 @@
 </p:sld>
 </file>
 
-<file path=ppt/slides/slide11.xml><?xml version="1.0" encoding="utf-8"?>
+<file path=ppt/slides/slide18.xml><?xml version="1.0" encoding="utf-8"?>
 <p:sld xmlns:a="http://schemas.openxmlformats.org/drawingml/2006/main" xmlns:r="http://schemas.openxmlformats.org/officeDocument/2006/relationships" xmlns:p="http://schemas.openxmlformats.org/presentationml/2006/main">
   <p:cSld>
     <p:spTree>
@@ -6148,7 +7090,7 @@
 </p:sld>
 </file>
 
-<file path=ppt/slides/slide12.xml><?xml version="1.0" encoding="utf-8"?>
+<file path=ppt/slides/slide19.xml><?xml version="1.0" encoding="utf-8"?>
 <p:sld xmlns:a="http://schemas.openxmlformats.org/drawingml/2006/main" xmlns:r="http://schemas.openxmlformats.org/officeDocument/2006/relationships" xmlns:p="http://schemas.openxmlformats.org/presentationml/2006/main">
   <p:cSld>
     <p:spTree>
@@ -7069,34 +8011,6 @@
             <a:r>
               <a:rPr lang="en-US" dirty="0"/>
               <a:t>Practices for Managing Projects</a:t>
-            </a:r>
-          </a:p>
-        </p:txBody>
-      </p:sp>
-      <p:sp>
-        <p:nvSpPr>
-          <p:cNvPr id="3" name="Content Placeholder 2">
-            <a:extLst>
-              <a:ext uri="{FF2B5EF4-FFF2-40B4-BE49-F238E27FC236}">
-                <a16:creationId xmlns:a16="http://schemas.microsoft.com/office/drawing/2014/main" id="{026BC183-0642-DDA2-10EE-B08C2DE60A5E}"/>
-              </a:ext>
-            </a:extLst>
-          </p:cNvPr>
-          <p:cNvSpPr>
-            <a:spLocks noGrp="1"/>
-          </p:cNvSpPr>
-          <p:nvPr>
-            <p:ph idx="1"/>
-          </p:nvPr>
-        </p:nvSpPr>
-        <p:spPr/>
-        <p:txBody>
-          <a:bodyPr/>
-          <a:lstStyle/>
-          <a:p>
-            <a:r>
-              <a:rPr lang="en-US" dirty="0"/>
-              <a:t>START WHEN I GET BACK TO THE OFFICE ON AUG 1</a:t>
             </a:r>
           </a:p>
         </p:txBody>

</xml_diff>

<commit_message>
updated bib and ppt
</commit_message>
<xml_diff>
--- a/r-project-mgmt-repro/nih-r-project-mgmt-training-material/nihl-r-project-mgmt.pptx
+++ b/r-project-mgmt-repro/nih-r-project-mgmt-training-material/nihl-r-project-mgmt.pptx
@@ -6,7 +6,7 @@
     <p:sldMasterId id="2147483669" r:id="rId5"/>
   </p:sldMasterIdLst>
   <p:notesMasterIdLst>
-    <p:notesMasterId r:id="rId25"/>
+    <p:notesMasterId r:id="rId29"/>
   </p:notesMasterIdLst>
   <p:sldIdLst>
     <p:sldId id="275" r:id="rId6"/>
@@ -16,18 +16,22 @@
     <p:sldId id="270" r:id="rId10"/>
     <p:sldId id="271" r:id="rId11"/>
     <p:sldId id="272" r:id="rId12"/>
-    <p:sldId id="273" r:id="rId13"/>
-    <p:sldId id="274" r:id="rId14"/>
-    <p:sldId id="276" r:id="rId15"/>
-    <p:sldId id="277" r:id="rId16"/>
-    <p:sldId id="278" r:id="rId17"/>
-    <p:sldId id="279" r:id="rId18"/>
-    <p:sldId id="280" r:id="rId19"/>
-    <p:sldId id="281" r:id="rId20"/>
-    <p:sldId id="282" r:id="rId21"/>
-    <p:sldId id="268" r:id="rId22"/>
-    <p:sldId id="263" r:id="rId23"/>
-    <p:sldId id="261" r:id="rId24"/>
+    <p:sldId id="284" r:id="rId13"/>
+    <p:sldId id="273" r:id="rId14"/>
+    <p:sldId id="274" r:id="rId15"/>
+    <p:sldId id="276" r:id="rId16"/>
+    <p:sldId id="277" r:id="rId17"/>
+    <p:sldId id="278" r:id="rId18"/>
+    <p:sldId id="279" r:id="rId19"/>
+    <p:sldId id="280" r:id="rId20"/>
+    <p:sldId id="281" r:id="rId21"/>
+    <p:sldId id="282" r:id="rId22"/>
+    <p:sldId id="283" r:id="rId23"/>
+    <p:sldId id="286" r:id="rId24"/>
+    <p:sldId id="285" r:id="rId25"/>
+    <p:sldId id="268" r:id="rId26"/>
+    <p:sldId id="263" r:id="rId27"/>
+    <p:sldId id="261" r:id="rId28"/>
   </p:sldIdLst>
   <p:sldSz cx="12192000" cy="6858000"/>
   <p:notesSz cx="6858000" cy="9144000"/>
@@ -556,7 +560,7 @@
           <a:p>
             <a:fld id="{4A4B1717-F3D4-4537-98D9-2D53D2FEF0EC}" type="slidenum">
               <a:rPr lang="en-US" smtClean="0"/>
-              <a:t>17</a:t>
+              <a:t>21</a:t>
             </a:fld>
             <a:endParaRPr lang="en-US"/>
           </a:p>
@@ -5661,6 +5665,64 @@
           <p:cNvPr id="2" name="Title 1">
             <a:extLst>
               <a:ext uri="{FF2B5EF4-FFF2-40B4-BE49-F238E27FC236}">
+                <a16:creationId xmlns:a16="http://schemas.microsoft.com/office/drawing/2014/main" id="{0CBD8440-B870-F737-CD06-2E874A553E5D}"/>
+              </a:ext>
+            </a:extLst>
+          </p:cNvPr>
+          <p:cNvSpPr>
+            <a:spLocks noGrp="1"/>
+          </p:cNvSpPr>
+          <p:nvPr>
+            <p:ph type="title"/>
+          </p:nvPr>
+        </p:nvSpPr>
+        <p:spPr/>
+        <p:txBody>
+          <a:bodyPr/>
+          <a:lstStyle/>
+          <a:p>
+            <a:r>
+              <a:rPr lang="en-US" dirty="0"/>
+              <a:t>Practices for Managing Projects</a:t>
+            </a:r>
+          </a:p>
+        </p:txBody>
+      </p:sp>
+    </p:spTree>
+    <p:extLst>
+      <p:ext uri="{BB962C8B-B14F-4D97-AF65-F5344CB8AC3E}">
+        <p14:creationId xmlns:p14="http://schemas.microsoft.com/office/powerpoint/2010/main" val="2082267965"/>
+      </p:ext>
+    </p:extLst>
+  </p:cSld>
+  <p:clrMapOvr>
+    <a:masterClrMapping/>
+  </p:clrMapOvr>
+</p:sld>
+</file>
+
+<file path=ppt/slides/slide11.xml><?xml version="1.0" encoding="utf-8"?>
+<p:sld xmlns:a="http://schemas.openxmlformats.org/drawingml/2006/main" xmlns:r="http://schemas.openxmlformats.org/officeDocument/2006/relationships" xmlns:p="http://schemas.openxmlformats.org/presentationml/2006/main">
+  <p:cSld>
+    <p:spTree>
+      <p:nvGrpSpPr>
+        <p:cNvPr id="1" name=""/>
+        <p:cNvGrpSpPr/>
+        <p:nvPr/>
+      </p:nvGrpSpPr>
+      <p:grpSpPr>
+        <a:xfrm>
+          <a:off x="0" y="0"/>
+          <a:ext cx="0" cy="0"/>
+          <a:chOff x="0" y="0"/>
+          <a:chExt cx="0" cy="0"/>
+        </a:xfrm>
+      </p:grpSpPr>
+      <p:sp>
+        <p:nvSpPr>
+          <p:cNvPr id="2" name="Title 1">
+            <a:extLst>
+              <a:ext uri="{FF2B5EF4-FFF2-40B4-BE49-F238E27FC236}">
                 <a16:creationId xmlns:a16="http://schemas.microsoft.com/office/drawing/2014/main" id="{2369109C-8A22-D19C-F5D3-86764FA346DF}"/>
               </a:ext>
             </a:extLst>
@@ -5767,7 +5829,7 @@
 </p:sld>
 </file>
 
-<file path=ppt/slides/slide11.xml><?xml version="1.0" encoding="utf-8"?>
+<file path=ppt/slides/slide12.xml><?xml version="1.0" encoding="utf-8"?>
 <p:sld xmlns:a="http://schemas.openxmlformats.org/drawingml/2006/main" xmlns:r="http://schemas.openxmlformats.org/officeDocument/2006/relationships" xmlns:p="http://schemas.openxmlformats.org/presentationml/2006/main">
   <p:cSld>
     <p:spTree>
@@ -5915,7 +5977,7 @@
 </p:sld>
 </file>
 
-<file path=ppt/slides/slide12.xml><?xml version="1.0" encoding="utf-8"?>
+<file path=ppt/slides/slide13.xml><?xml version="1.0" encoding="utf-8"?>
 <p:sld xmlns:a="http://schemas.openxmlformats.org/drawingml/2006/main" xmlns:r="http://schemas.openxmlformats.org/officeDocument/2006/relationships" xmlns:p="http://schemas.openxmlformats.org/presentationml/2006/main">
   <p:cSld>
     <p:spTree>
@@ -6035,7 +6097,7 @@
 </p:sld>
 </file>
 
-<file path=ppt/slides/slide13.xml><?xml version="1.0" encoding="utf-8"?>
+<file path=ppt/slides/slide14.xml><?xml version="1.0" encoding="utf-8"?>
 <p:sld xmlns:a="http://schemas.openxmlformats.org/drawingml/2006/main" xmlns:r="http://schemas.openxmlformats.org/officeDocument/2006/relationships" xmlns:p="http://schemas.openxmlformats.org/presentationml/2006/main">
   <p:cSld>
     <p:spTree>
@@ -6175,128 +6237,6 @@
 </p:sld>
 </file>
 
-<file path=ppt/slides/slide14.xml><?xml version="1.0" encoding="utf-8"?>
-<p:sld xmlns:a="http://schemas.openxmlformats.org/drawingml/2006/main" xmlns:r="http://schemas.openxmlformats.org/officeDocument/2006/relationships" xmlns:p="http://schemas.openxmlformats.org/presentationml/2006/main">
-  <p:cSld>
-    <p:spTree>
-      <p:nvGrpSpPr>
-        <p:cNvPr id="1" name=""/>
-        <p:cNvGrpSpPr/>
-        <p:nvPr/>
-      </p:nvGrpSpPr>
-      <p:grpSpPr>
-        <a:xfrm>
-          <a:off x="0" y="0"/>
-          <a:ext cx="0" cy="0"/>
-          <a:chOff x="0" y="0"/>
-          <a:chExt cx="0" cy="0"/>
-        </a:xfrm>
-      </p:grpSpPr>
-      <p:sp>
-        <p:nvSpPr>
-          <p:cNvPr id="2" name="Title 1">
-            <a:extLst>
-              <a:ext uri="{FF2B5EF4-FFF2-40B4-BE49-F238E27FC236}">
-                <a16:creationId xmlns:a16="http://schemas.microsoft.com/office/drawing/2014/main" id="{249E2E84-486A-BDD4-BEC1-F2BA997B4A1C}"/>
-              </a:ext>
-            </a:extLst>
-          </p:cNvPr>
-          <p:cNvSpPr>
-            <a:spLocks noGrp="1"/>
-          </p:cNvSpPr>
-          <p:nvPr>
-            <p:ph type="title"/>
-          </p:nvPr>
-        </p:nvSpPr>
-        <p:spPr/>
-        <p:txBody>
-          <a:bodyPr/>
-          <a:lstStyle/>
-          <a:p>
-            <a:r>
-              <a:rPr lang="en-US" dirty="0"/>
-              <a:t>Practice Good File Organization</a:t>
-            </a:r>
-          </a:p>
-        </p:txBody>
-      </p:sp>
-      <p:sp>
-        <p:nvSpPr>
-          <p:cNvPr id="3" name="Content Placeholder 2">
-            <a:extLst>
-              <a:ext uri="{FF2B5EF4-FFF2-40B4-BE49-F238E27FC236}">
-                <a16:creationId xmlns:a16="http://schemas.microsoft.com/office/drawing/2014/main" id="{C89D2DDD-46D8-D857-AD22-435640ACEFB8}"/>
-              </a:ext>
-            </a:extLst>
-          </p:cNvPr>
-          <p:cNvSpPr>
-            <a:spLocks noGrp="1"/>
-          </p:cNvSpPr>
-          <p:nvPr>
-            <p:ph idx="1"/>
-          </p:nvPr>
-        </p:nvSpPr>
-        <p:spPr/>
-        <p:txBody>
-          <a:bodyPr>
-            <a:normAutofit/>
-          </a:bodyPr>
-          <a:lstStyle/>
-          <a:p>
-            <a:r>
-              <a:rPr lang="en-US" dirty="0">
-                <a:hlinkClick r:id="rId2"/>
-              </a:rPr>
-              <a:t>Good Enough Practices for Scientific Computing</a:t>
-            </a:r>
-            <a:r>
-              <a:rPr lang="en-US" dirty="0"/>
-              <a:t> gives the following recommendations for project organization:</a:t>
-            </a:r>
-          </a:p>
-          <a:p>
-            <a:pPr lvl="1"/>
-            <a:r>
-              <a:rPr lang="en-US" dirty="0"/>
-              <a:t>Each project in its own directory, which is named after the project</a:t>
-            </a:r>
-          </a:p>
-          <a:p>
-            <a:pPr lvl="1"/>
-            <a:r>
-              <a:rPr lang="en-US" dirty="0"/>
-              <a:t>Text documents associated with the project in the doc directory</a:t>
-            </a:r>
-          </a:p>
-          <a:p>
-            <a:pPr lvl="1"/>
-            <a:r>
-              <a:rPr lang="en-US" dirty="0"/>
-              <a:t>Raw data and metadata in the data directory (raw-data)</a:t>
-            </a:r>
-          </a:p>
-          <a:p>
-            <a:pPr lvl="1"/>
-            <a:r>
-              <a:rPr lang="en-US" dirty="0"/>
-              <a:t>Files generated during cleanup and analysis in a results directory</a:t>
-            </a:r>
-          </a:p>
-        </p:txBody>
-      </p:sp>
-    </p:spTree>
-    <p:extLst>
-      <p:ext uri="{BB962C8B-B14F-4D97-AF65-F5344CB8AC3E}">
-        <p14:creationId xmlns:p14="http://schemas.microsoft.com/office/powerpoint/2010/main" val="3031811970"/>
-      </p:ext>
-    </p:extLst>
-  </p:cSld>
-  <p:clrMapOvr>
-    <a:masterClrMapping/>
-  </p:clrMapOvr>
-</p:sld>
-</file>
-
 <file path=ppt/slides/slide15.xml><?xml version="1.0" encoding="utf-8"?>
 <p:sld xmlns:a="http://schemas.openxmlformats.org/drawingml/2006/main" xmlns:r="http://schemas.openxmlformats.org/officeDocument/2006/relationships" xmlns:p="http://schemas.openxmlformats.org/presentationml/2006/main">
   <p:cSld>
@@ -6380,47 +6320,28 @@
             <a:pPr lvl="1"/>
             <a:r>
               <a:rPr lang="en-US" dirty="0"/>
-              <a:t>Project's scripts and programs in the </a:t>
-            </a:r>
-            <a:r>
-              <a:rPr lang="en-US" dirty="0" err="1"/>
-              <a:t>src</a:t>
-            </a:r>
+              <a:t>Each project in its own directory, which is named after the project</a:t>
+            </a:r>
+          </a:p>
+          <a:p>
+            <a:pPr lvl="1"/>
             <a:r>
               <a:rPr lang="en-US" dirty="0"/>
-              <a:t> directory</a:t>
+              <a:t>Text documents associated with the project in the doc directory</a:t>
             </a:r>
           </a:p>
           <a:p>
             <a:pPr lvl="1"/>
             <a:r>
               <a:rPr lang="en-US" dirty="0"/>
-              <a:t>Programs brought in from elsewhere or compiled locally in the bin directory</a:t>
+              <a:t>Raw data and metadata in the data directory (raw-data)</a:t>
             </a:r>
           </a:p>
           <a:p>
             <a:pPr lvl="1"/>
             <a:r>
               <a:rPr lang="en-US" dirty="0"/>
-              <a:t>Name all files to reflect their content or function</a:t>
-            </a:r>
-          </a:p>
-          <a:p>
-            <a:pPr lvl="1"/>
-            <a:r>
-              <a:rPr lang="en-US" dirty="0"/>
-              <a:t>README file to a repository to communicate important information about your project</a:t>
-            </a:r>
-          </a:p>
-          <a:p>
-            <a:pPr lvl="1"/>
-            <a:r>
-              <a:rPr lang="en-US" dirty="0" err="1"/>
-              <a:t>CITATION.cff</a:t>
-            </a:r>
-            <a:r>
-              <a:rPr lang="en-US" dirty="0"/>
-              <a:t> file to the root of a repository to let others know how you would like them to cite your work</a:t>
+              <a:t>Files generated during cleanup and analysis in a results directory</a:t>
             </a:r>
           </a:p>
         </p:txBody>
@@ -6428,7 +6349,7 @@
     </p:spTree>
     <p:extLst>
       <p:ext uri="{BB962C8B-B14F-4D97-AF65-F5344CB8AC3E}">
-        <p14:creationId xmlns:p14="http://schemas.microsoft.com/office/powerpoint/2010/main" val="1853473135"/>
+        <p14:creationId xmlns:p14="http://schemas.microsoft.com/office/powerpoint/2010/main" val="3031811970"/>
       </p:ext>
     </p:extLst>
   </p:cSld>
@@ -6507,6 +6428,147 @@
           <a:lstStyle/>
           <a:p>
             <a:r>
+              <a:rPr lang="en-US" dirty="0">
+                <a:hlinkClick r:id="rId2"/>
+              </a:rPr>
+              <a:t>Good Enough Practices for Scientific Computing</a:t>
+            </a:r>
+            <a:r>
+              <a:rPr lang="en-US" dirty="0"/>
+              <a:t> gives the following recommendations for project organization:</a:t>
+            </a:r>
+          </a:p>
+          <a:p>
+            <a:pPr lvl="1"/>
+            <a:r>
+              <a:rPr lang="en-US" dirty="0"/>
+              <a:t>Project's scripts and programs in the </a:t>
+            </a:r>
+            <a:r>
+              <a:rPr lang="en-US" dirty="0" err="1"/>
+              <a:t>src</a:t>
+            </a:r>
+            <a:r>
+              <a:rPr lang="en-US" dirty="0"/>
+              <a:t> directory</a:t>
+            </a:r>
+          </a:p>
+          <a:p>
+            <a:pPr lvl="1"/>
+            <a:r>
+              <a:rPr lang="en-US" dirty="0"/>
+              <a:t>Programs brought in from elsewhere or compiled locally in the bin directory</a:t>
+            </a:r>
+          </a:p>
+          <a:p>
+            <a:pPr lvl="1"/>
+            <a:r>
+              <a:rPr lang="en-US" dirty="0"/>
+              <a:t>Name all files to reflect their content or function</a:t>
+            </a:r>
+          </a:p>
+          <a:p>
+            <a:pPr lvl="1"/>
+            <a:r>
+              <a:rPr lang="en-US" dirty="0"/>
+              <a:t>README file to a repository to communicate important information about your project</a:t>
+            </a:r>
+          </a:p>
+          <a:p>
+            <a:pPr lvl="1"/>
+            <a:r>
+              <a:rPr lang="en-US" dirty="0" err="1"/>
+              <a:t>CITATION.cff</a:t>
+            </a:r>
+            <a:r>
+              <a:rPr lang="en-US" dirty="0"/>
+              <a:t> file to the root of a repository to let others know how you would like them to cite your work</a:t>
+            </a:r>
+          </a:p>
+        </p:txBody>
+      </p:sp>
+    </p:spTree>
+    <p:extLst>
+      <p:ext uri="{BB962C8B-B14F-4D97-AF65-F5344CB8AC3E}">
+        <p14:creationId xmlns:p14="http://schemas.microsoft.com/office/powerpoint/2010/main" val="1853473135"/>
+      </p:ext>
+    </p:extLst>
+  </p:cSld>
+  <p:clrMapOvr>
+    <a:masterClrMapping/>
+  </p:clrMapOvr>
+</p:sld>
+</file>
+
+<file path=ppt/slides/slide17.xml><?xml version="1.0" encoding="utf-8"?>
+<p:sld xmlns:a="http://schemas.openxmlformats.org/drawingml/2006/main" xmlns:r="http://schemas.openxmlformats.org/officeDocument/2006/relationships" xmlns:p="http://schemas.openxmlformats.org/presentationml/2006/main">
+  <p:cSld>
+    <p:spTree>
+      <p:nvGrpSpPr>
+        <p:cNvPr id="1" name=""/>
+        <p:cNvGrpSpPr/>
+        <p:nvPr/>
+      </p:nvGrpSpPr>
+      <p:grpSpPr>
+        <a:xfrm>
+          <a:off x="0" y="0"/>
+          <a:ext cx="0" cy="0"/>
+          <a:chOff x="0" y="0"/>
+          <a:chExt cx="0" cy="0"/>
+        </a:xfrm>
+      </p:grpSpPr>
+      <p:sp>
+        <p:nvSpPr>
+          <p:cNvPr id="2" name="Title 1">
+            <a:extLst>
+              <a:ext uri="{FF2B5EF4-FFF2-40B4-BE49-F238E27FC236}">
+                <a16:creationId xmlns:a16="http://schemas.microsoft.com/office/drawing/2014/main" id="{249E2E84-486A-BDD4-BEC1-F2BA997B4A1C}"/>
+              </a:ext>
+            </a:extLst>
+          </p:cNvPr>
+          <p:cNvSpPr>
+            <a:spLocks noGrp="1"/>
+          </p:cNvSpPr>
+          <p:nvPr>
+            <p:ph type="title"/>
+          </p:nvPr>
+        </p:nvSpPr>
+        <p:spPr/>
+        <p:txBody>
+          <a:bodyPr/>
+          <a:lstStyle/>
+          <a:p>
+            <a:r>
+              <a:rPr lang="en-US" dirty="0"/>
+              <a:t>Practice Good File Organization</a:t>
+            </a:r>
+          </a:p>
+        </p:txBody>
+      </p:sp>
+      <p:sp>
+        <p:nvSpPr>
+          <p:cNvPr id="3" name="Content Placeholder 2">
+            <a:extLst>
+              <a:ext uri="{FF2B5EF4-FFF2-40B4-BE49-F238E27FC236}">
+                <a16:creationId xmlns:a16="http://schemas.microsoft.com/office/drawing/2014/main" id="{C89D2DDD-46D8-D857-AD22-435640ACEFB8}"/>
+              </a:ext>
+            </a:extLst>
+          </p:cNvPr>
+          <p:cNvSpPr>
+            <a:spLocks noGrp="1"/>
+          </p:cNvSpPr>
+          <p:nvPr>
+            <p:ph idx="1"/>
+          </p:nvPr>
+        </p:nvSpPr>
+        <p:spPr/>
+        <p:txBody>
+          <a:bodyPr>
+            <a:normAutofit/>
+          </a:bodyPr>
+          <a:lstStyle/>
+          <a:p>
+            <a:r>
               <a:rPr lang="en-US" dirty="0"/>
               <a:t>Additional filles to include:</a:t>
             </a:r>
@@ -6540,20 +6602,20 @@
           <a:p>
             <a:pPr lvl="1"/>
             <a:r>
-              <a:rPr lang="en-US" dirty="0" err="1">
-                <a:hlinkClick r:id="rId4"/>
-              </a:rPr>
-              <a:t>CITATION.cff</a:t>
-            </a:r>
-            <a:r>
               <a:rPr lang="en-US" dirty="0">
                 <a:hlinkClick r:id="rId4"/>
               </a:rPr>
-              <a:t> file</a:t>
+              <a:t>CITATION.cff file</a:t>
             </a:r>
             <a:r>
               <a:rPr lang="en-US" dirty="0"/>
               <a:t>, to let others know how you would like them to cite your work</a:t>
+            </a:r>
+          </a:p>
+          <a:p>
+            <a:r>
+              <a:rPr lang="en-US" dirty="0"/>
+              <a:t>Student version of the PowerPoint has more resources to explore</a:t>
             </a:r>
           </a:p>
           <a:p>
@@ -6574,7 +6636,382 @@
 </p:sld>
 </file>
 
-<file path=ppt/slides/slide17.xml><?xml version="1.0" encoding="utf-8"?>
+<file path=ppt/slides/slide18.xml><?xml version="1.0" encoding="utf-8"?>
+<p:sld xmlns:a="http://schemas.openxmlformats.org/drawingml/2006/main" xmlns:r="http://schemas.openxmlformats.org/officeDocument/2006/relationships" xmlns:p="http://schemas.openxmlformats.org/presentationml/2006/main">
+  <p:cSld>
+    <p:spTree>
+      <p:nvGrpSpPr>
+        <p:cNvPr id="1" name=""/>
+        <p:cNvGrpSpPr/>
+        <p:nvPr/>
+      </p:nvGrpSpPr>
+      <p:grpSpPr>
+        <a:xfrm>
+          <a:off x="0" y="0"/>
+          <a:ext cx="0" cy="0"/>
+          <a:chOff x="0" y="0"/>
+          <a:chExt cx="0" cy="0"/>
+        </a:xfrm>
+      </p:grpSpPr>
+      <p:sp>
+        <p:nvSpPr>
+          <p:cNvPr id="2" name="Title 1">
+            <a:extLst>
+              <a:ext uri="{FF2B5EF4-FFF2-40B4-BE49-F238E27FC236}">
+                <a16:creationId xmlns:a16="http://schemas.microsoft.com/office/drawing/2014/main" id="{5905BED1-DB8F-963C-1B6C-9D284A1D3FE2}"/>
+              </a:ext>
+            </a:extLst>
+          </p:cNvPr>
+          <p:cNvSpPr>
+            <a:spLocks noGrp="1"/>
+          </p:cNvSpPr>
+          <p:nvPr>
+            <p:ph type="title"/>
+          </p:nvPr>
+        </p:nvSpPr>
+        <p:spPr/>
+        <p:txBody>
+          <a:bodyPr/>
+          <a:lstStyle/>
+          <a:p>
+            <a:r>
+              <a:rPr lang="en-US" dirty="0"/>
+              <a:t>Using Version Control in RStudio Demo</a:t>
+            </a:r>
+          </a:p>
+        </p:txBody>
+      </p:sp>
+      <p:pic>
+        <p:nvPicPr>
+          <p:cNvPr id="3" name="Picture 2" descr="Icon&#10;&#10;Description automatically generated">
+            <a:extLst>
+              <a:ext uri="{FF2B5EF4-FFF2-40B4-BE49-F238E27FC236}">
+                <a16:creationId xmlns:a16="http://schemas.microsoft.com/office/drawing/2014/main" id="{F1D129FF-4F9D-3A4C-37B1-B4E13AA7FE2D}"/>
+              </a:ext>
+            </a:extLst>
+          </p:cNvPr>
+          <p:cNvPicPr>
+            <a:picLocks noChangeAspect="1"/>
+          </p:cNvPicPr>
+          <p:nvPr/>
+        </p:nvPicPr>
+        <p:blipFill>
+          <a:blip r:embed="rId2">
+            <a:extLst>
+              <a:ext uri="{28A0092B-C50C-407E-A947-70E740481C1C}">
+                <a14:useLocalDpi xmlns:a14="http://schemas.microsoft.com/office/drawing/2010/main" val="0"/>
+              </a:ext>
+            </a:extLst>
+          </a:blip>
+          <a:stretch>
+            <a:fillRect/>
+          </a:stretch>
+        </p:blipFill>
+        <p:spPr>
+          <a:xfrm>
+            <a:off x="8750808" y="316992"/>
+            <a:ext cx="3200400" cy="3200400"/>
+          </a:xfrm>
+          <a:prstGeom prst="rect">
+            <a:avLst/>
+          </a:prstGeom>
+        </p:spPr>
+      </p:pic>
+    </p:spTree>
+    <p:extLst>
+      <p:ext uri="{BB962C8B-B14F-4D97-AF65-F5344CB8AC3E}">
+        <p14:creationId xmlns:p14="http://schemas.microsoft.com/office/powerpoint/2010/main" val="3441749092"/>
+      </p:ext>
+    </p:extLst>
+  </p:cSld>
+  <p:clrMapOvr>
+    <a:masterClrMapping/>
+  </p:clrMapOvr>
+</p:sld>
+</file>
+
+<file path=ppt/slides/slide19.xml><?xml version="1.0" encoding="utf-8"?>
+<p:sld xmlns:a="http://schemas.openxmlformats.org/drawingml/2006/main" xmlns:r="http://schemas.openxmlformats.org/officeDocument/2006/relationships" xmlns:p="http://schemas.openxmlformats.org/presentationml/2006/main">
+  <p:cSld>
+    <p:spTree>
+      <p:nvGrpSpPr>
+        <p:cNvPr id="1" name=""/>
+        <p:cNvGrpSpPr/>
+        <p:nvPr/>
+      </p:nvGrpSpPr>
+      <p:grpSpPr>
+        <a:xfrm>
+          <a:off x="0" y="0"/>
+          <a:ext cx="0" cy="0"/>
+          <a:chOff x="0" y="0"/>
+          <a:chExt cx="0" cy="0"/>
+        </a:xfrm>
+      </p:grpSpPr>
+      <p:sp>
+        <p:nvSpPr>
+          <p:cNvPr id="2" name="Title 1">
+            <a:extLst>
+              <a:ext uri="{FF2B5EF4-FFF2-40B4-BE49-F238E27FC236}">
+                <a16:creationId xmlns:a16="http://schemas.microsoft.com/office/drawing/2014/main" id="{6C734A1D-9568-B8CD-D300-D9F7F72C74F0}"/>
+              </a:ext>
+            </a:extLst>
+          </p:cNvPr>
+          <p:cNvSpPr>
+            <a:spLocks noGrp="1"/>
+          </p:cNvSpPr>
+          <p:nvPr>
+            <p:ph type="title"/>
+          </p:nvPr>
+        </p:nvSpPr>
+        <p:spPr/>
+        <p:txBody>
+          <a:bodyPr/>
+          <a:lstStyle/>
+          <a:p>
+            <a:r>
+              <a:rPr lang="en-US" dirty="0"/>
+              <a:t>Workflows in Git</a:t>
+            </a:r>
+          </a:p>
+        </p:txBody>
+      </p:sp>
+      <p:pic>
+        <p:nvPicPr>
+          <p:cNvPr id="4" name="Picture 3" descr="A picture containing text, screenshot&#10;&#10;Description automatically generated">
+            <a:extLst>
+              <a:ext uri="{FF2B5EF4-FFF2-40B4-BE49-F238E27FC236}">
+                <a16:creationId xmlns:a16="http://schemas.microsoft.com/office/drawing/2014/main" id="{DF5713C5-5C03-C0F8-8A19-0968B74BC325}"/>
+              </a:ext>
+            </a:extLst>
+          </p:cNvPr>
+          <p:cNvPicPr>
+            <a:picLocks noChangeAspect="1"/>
+          </p:cNvPicPr>
+          <p:nvPr/>
+        </p:nvPicPr>
+        <p:blipFill>
+          <a:blip r:embed="rId2">
+            <a:extLst>
+              <a:ext uri="{28A0092B-C50C-407E-A947-70E740481C1C}">
+                <a14:useLocalDpi xmlns:a14="http://schemas.microsoft.com/office/drawing/2010/main" val="0"/>
+              </a:ext>
+            </a:extLst>
+          </a:blip>
+          <a:stretch>
+            <a:fillRect/>
+          </a:stretch>
+        </p:blipFill>
+        <p:spPr>
+          <a:xfrm>
+            <a:off x="3718998" y="1101680"/>
+            <a:ext cx="4114800" cy="5591728"/>
+          </a:xfrm>
+          <a:prstGeom prst="rect">
+            <a:avLst/>
+          </a:prstGeom>
+        </p:spPr>
+      </p:pic>
+    </p:spTree>
+    <p:extLst>
+      <p:ext uri="{BB962C8B-B14F-4D97-AF65-F5344CB8AC3E}">
+        <p14:creationId xmlns:p14="http://schemas.microsoft.com/office/powerpoint/2010/main" val="202559168"/>
+      </p:ext>
+    </p:extLst>
+  </p:cSld>
+  <p:clrMapOvr>
+    <a:masterClrMapping/>
+  </p:clrMapOvr>
+</p:sld>
+</file>
+
+<file path=ppt/slides/slide2.xml><?xml version="1.0" encoding="utf-8"?>
+<p:sld xmlns:a="http://schemas.openxmlformats.org/drawingml/2006/main" xmlns:r="http://schemas.openxmlformats.org/officeDocument/2006/relationships" xmlns:p="http://schemas.openxmlformats.org/presentationml/2006/main">
+  <p:cSld>
+    <p:spTree>
+      <p:nvGrpSpPr>
+        <p:cNvPr id="1" name=""/>
+        <p:cNvGrpSpPr/>
+        <p:nvPr/>
+      </p:nvGrpSpPr>
+      <p:grpSpPr>
+        <a:xfrm>
+          <a:off x="0" y="0"/>
+          <a:ext cx="0" cy="0"/>
+          <a:chOff x="0" y="0"/>
+          <a:chExt cx="0" cy="0"/>
+        </a:xfrm>
+      </p:grpSpPr>
+      <p:sp>
+        <p:nvSpPr>
+          <p:cNvPr id="2" name="Title 1"/>
+          <p:cNvSpPr>
+            <a:spLocks noGrp="1"/>
+          </p:cNvSpPr>
+          <p:nvPr>
+            <p:ph type="ctrTitle"/>
+          </p:nvPr>
+        </p:nvSpPr>
+        <p:spPr/>
+        <p:txBody>
+          <a:bodyPr/>
+          <a:lstStyle/>
+          <a:p>
+            <a:r>
+              <a:rPr lang="en-US" dirty="0"/>
+              <a:t>Project Management and Reproducibility In </a:t>
+            </a:r>
+            <a:r>
+              <a:rPr lang="en-US" dirty="0" err="1"/>
+              <a:t>Rstudio</a:t>
+            </a:r>
+            <a:r>
+              <a:rPr lang="en-US" dirty="0"/>
+              <a:t> (Part 1)</a:t>
+            </a:r>
+          </a:p>
+        </p:txBody>
+      </p:sp>
+      <p:sp>
+        <p:nvSpPr>
+          <p:cNvPr id="3" name="Subtitle 2"/>
+          <p:cNvSpPr>
+            <a:spLocks noGrp="1"/>
+          </p:cNvSpPr>
+          <p:nvPr>
+            <p:ph type="subTitle" idx="1"/>
+          </p:nvPr>
+        </p:nvSpPr>
+        <p:spPr/>
+        <p:txBody>
+          <a:bodyPr>
+            <a:noAutofit/>
+          </a:bodyPr>
+          <a:lstStyle/>
+          <a:p>
+            <a:r>
+              <a:rPr lang="en-US" sz="2000" dirty="0"/>
+              <a:t>Doug Joubert</a:t>
+            </a:r>
+          </a:p>
+          <a:p>
+            <a:r>
+              <a:rPr lang="en-US" sz="2000" dirty="0"/>
+              <a:t>2022-10-11</a:t>
+            </a:r>
+          </a:p>
+        </p:txBody>
+      </p:sp>
+    </p:spTree>
+    <p:extLst>
+      <p:ext uri="{BB962C8B-B14F-4D97-AF65-F5344CB8AC3E}">
+        <p14:creationId xmlns:p14="http://schemas.microsoft.com/office/powerpoint/2010/main" val="2464044174"/>
+      </p:ext>
+    </p:extLst>
+  </p:cSld>
+  <p:clrMapOvr>
+    <a:masterClrMapping/>
+  </p:clrMapOvr>
+</p:sld>
+</file>
+
+<file path=ppt/slides/slide20.xml><?xml version="1.0" encoding="utf-8"?>
+<p:sld xmlns:a="http://schemas.openxmlformats.org/drawingml/2006/main" xmlns:r="http://schemas.openxmlformats.org/officeDocument/2006/relationships" xmlns:p="http://schemas.openxmlformats.org/presentationml/2006/main" show="0">
+  <p:cSld>
+    <p:spTree>
+      <p:nvGrpSpPr>
+        <p:cNvPr id="1" name=""/>
+        <p:cNvGrpSpPr/>
+        <p:nvPr/>
+      </p:nvGrpSpPr>
+      <p:grpSpPr>
+        <a:xfrm>
+          <a:off x="0" y="0"/>
+          <a:ext cx="0" cy="0"/>
+          <a:chOff x="0" y="0"/>
+          <a:chExt cx="0" cy="0"/>
+        </a:xfrm>
+      </p:grpSpPr>
+      <p:sp>
+        <p:nvSpPr>
+          <p:cNvPr id="2" name="Title 1">
+            <a:extLst>
+              <a:ext uri="{FF2B5EF4-FFF2-40B4-BE49-F238E27FC236}">
+                <a16:creationId xmlns:a16="http://schemas.microsoft.com/office/drawing/2014/main" id="{BAA47C0F-A56F-7DC0-6438-0D855EEEE238}"/>
+              </a:ext>
+            </a:extLst>
+          </p:cNvPr>
+          <p:cNvSpPr>
+            <a:spLocks noGrp="1"/>
+          </p:cNvSpPr>
+          <p:nvPr>
+            <p:ph type="title"/>
+          </p:nvPr>
+        </p:nvSpPr>
+        <p:spPr/>
+        <p:txBody>
+          <a:bodyPr/>
+          <a:lstStyle/>
+          <a:p>
+            <a:r>
+              <a:rPr lang="en-US" dirty="0"/>
+              <a:t>Outline for Demo</a:t>
+            </a:r>
+          </a:p>
+        </p:txBody>
+      </p:sp>
+      <p:sp>
+        <p:nvSpPr>
+          <p:cNvPr id="3" name="Content Placeholder 2">
+            <a:extLst>
+              <a:ext uri="{FF2B5EF4-FFF2-40B4-BE49-F238E27FC236}">
+                <a16:creationId xmlns:a16="http://schemas.microsoft.com/office/drawing/2014/main" id="{AA1A6E05-BACA-890B-9535-2CF8D419DEA2}"/>
+              </a:ext>
+            </a:extLst>
+          </p:cNvPr>
+          <p:cNvSpPr>
+            <a:spLocks noGrp="1"/>
+          </p:cNvSpPr>
+          <p:nvPr>
+            <p:ph idx="1"/>
+          </p:nvPr>
+        </p:nvSpPr>
+        <p:spPr/>
+        <p:txBody>
+          <a:bodyPr>
+            <a:normAutofit/>
+          </a:bodyPr>
+          <a:lstStyle/>
+          <a:p>
+            <a:endParaRPr lang="en-US" dirty="0"/>
+          </a:p>
+          <a:p>
+            <a:r>
+              <a:rPr lang="en-US" dirty="0"/>
+              <a:t>Using version control in RStudio</a:t>
+            </a:r>
+          </a:p>
+          <a:p>
+            <a:endParaRPr lang="en-US" dirty="0"/>
+          </a:p>
+          <a:p>
+            <a:endParaRPr lang="en-US" dirty="0"/>
+          </a:p>
+        </p:txBody>
+      </p:sp>
+    </p:spTree>
+    <p:extLst>
+      <p:ext uri="{BB962C8B-B14F-4D97-AF65-F5344CB8AC3E}">
+        <p14:creationId xmlns:p14="http://schemas.microsoft.com/office/powerpoint/2010/main" val="2492154364"/>
+      </p:ext>
+    </p:extLst>
+  </p:cSld>
+  <p:clrMapOvr>
+    <a:masterClrMapping/>
+  </p:clrMapOvr>
+</p:sld>
+</file>
+
+<file path=ppt/slides/slide21.xml><?xml version="1.0" encoding="utf-8"?>
 <p:sld xmlns:a="http://schemas.openxmlformats.org/drawingml/2006/main" xmlns:r="http://schemas.openxmlformats.org/officeDocument/2006/relationships" xmlns:p="http://schemas.openxmlformats.org/presentationml/2006/main">
   <p:cSld>
     <p:spTree>
@@ -7037,7 +7474,7 @@
 </p:sld>
 </file>
 
-<file path=ppt/slides/slide18.xml><?xml version="1.0" encoding="utf-8"?>
+<file path=ppt/slides/slide22.xml><?xml version="1.0" encoding="utf-8"?>
 <p:sld xmlns:a="http://schemas.openxmlformats.org/drawingml/2006/main" xmlns:r="http://schemas.openxmlformats.org/officeDocument/2006/relationships" xmlns:p="http://schemas.openxmlformats.org/presentationml/2006/main">
   <p:cSld>
     <p:spTree>
@@ -7090,7 +7527,7 @@
 </p:sld>
 </file>
 
-<file path=ppt/slides/slide19.xml><?xml version="1.0" encoding="utf-8"?>
+<file path=ppt/slides/slide23.xml><?xml version="1.0" encoding="utf-8"?>
 <p:sld xmlns:a="http://schemas.openxmlformats.org/drawingml/2006/main" xmlns:r="http://schemas.openxmlformats.org/officeDocument/2006/relationships" xmlns:p="http://schemas.openxmlformats.org/presentationml/2006/main">
   <p:cSld>
     <p:spTree>
@@ -7111,96 +7548,6 @@
     <p:extLst>
       <p:ext uri="{BB962C8B-B14F-4D97-AF65-F5344CB8AC3E}">
         <p14:creationId xmlns:p14="http://schemas.microsoft.com/office/powerpoint/2010/main" val="2158435220"/>
-      </p:ext>
-    </p:extLst>
-  </p:cSld>
-  <p:clrMapOvr>
-    <a:masterClrMapping/>
-  </p:clrMapOvr>
-</p:sld>
-</file>
-
-<file path=ppt/slides/slide2.xml><?xml version="1.0" encoding="utf-8"?>
-<p:sld xmlns:a="http://schemas.openxmlformats.org/drawingml/2006/main" xmlns:r="http://schemas.openxmlformats.org/officeDocument/2006/relationships" xmlns:p="http://schemas.openxmlformats.org/presentationml/2006/main">
-  <p:cSld>
-    <p:spTree>
-      <p:nvGrpSpPr>
-        <p:cNvPr id="1" name=""/>
-        <p:cNvGrpSpPr/>
-        <p:nvPr/>
-      </p:nvGrpSpPr>
-      <p:grpSpPr>
-        <a:xfrm>
-          <a:off x="0" y="0"/>
-          <a:ext cx="0" cy="0"/>
-          <a:chOff x="0" y="0"/>
-          <a:chExt cx="0" cy="0"/>
-        </a:xfrm>
-      </p:grpSpPr>
-      <p:sp>
-        <p:nvSpPr>
-          <p:cNvPr id="2" name="Title 1"/>
-          <p:cNvSpPr>
-            <a:spLocks noGrp="1"/>
-          </p:cNvSpPr>
-          <p:nvPr>
-            <p:ph type="ctrTitle"/>
-          </p:nvPr>
-        </p:nvSpPr>
-        <p:spPr/>
-        <p:txBody>
-          <a:bodyPr/>
-          <a:lstStyle/>
-          <a:p>
-            <a:r>
-              <a:rPr lang="en-US" dirty="0"/>
-              <a:t>Project Management and Reproducibility In </a:t>
-            </a:r>
-            <a:r>
-              <a:rPr lang="en-US" dirty="0" err="1"/>
-              <a:t>Rstudio</a:t>
-            </a:r>
-            <a:r>
-              <a:rPr lang="en-US" dirty="0"/>
-              <a:t> (Part 1)</a:t>
-            </a:r>
-          </a:p>
-        </p:txBody>
-      </p:sp>
-      <p:sp>
-        <p:nvSpPr>
-          <p:cNvPr id="3" name="Subtitle 2"/>
-          <p:cNvSpPr>
-            <a:spLocks noGrp="1"/>
-          </p:cNvSpPr>
-          <p:nvPr>
-            <p:ph type="subTitle" idx="1"/>
-          </p:nvPr>
-        </p:nvSpPr>
-        <p:spPr/>
-        <p:txBody>
-          <a:bodyPr>
-            <a:noAutofit/>
-          </a:bodyPr>
-          <a:lstStyle/>
-          <a:p>
-            <a:r>
-              <a:rPr lang="en-US" sz="2000" dirty="0"/>
-              <a:t>Doug Joubert</a:t>
-            </a:r>
-          </a:p>
-          <a:p>
-            <a:r>
-              <a:rPr lang="en-US" sz="2000" dirty="0"/>
-              <a:t>2022-10-11</a:t>
-            </a:r>
-          </a:p>
-        </p:txBody>
-      </p:sp>
-    </p:spTree>
-    <p:extLst>
-      <p:ext uri="{BB962C8B-B14F-4D97-AF65-F5344CB8AC3E}">
-        <p14:creationId xmlns:p14="http://schemas.microsoft.com/office/powerpoint/2010/main" val="2464044174"/>
       </p:ext>
     </p:extLst>
   </p:cSld>
@@ -7871,6 +8218,100 @@
           <p:cNvPr id="2" name="Title 1">
             <a:extLst>
               <a:ext uri="{FF2B5EF4-FFF2-40B4-BE49-F238E27FC236}">
+                <a16:creationId xmlns:a16="http://schemas.microsoft.com/office/drawing/2014/main" id="{17E9F98F-DB41-BC37-E716-853E6D2D46A6}"/>
+              </a:ext>
+            </a:extLst>
+          </p:cNvPr>
+          <p:cNvSpPr>
+            <a:spLocks noGrp="1"/>
+          </p:cNvSpPr>
+          <p:nvPr>
+            <p:ph type="title"/>
+          </p:nvPr>
+        </p:nvSpPr>
+        <p:spPr/>
+        <p:txBody>
+          <a:bodyPr/>
+          <a:lstStyle/>
+          <a:p>
+            <a:r>
+              <a:rPr lang="en-US" dirty="0"/>
+              <a:t>GitHub and RStudio Project Demo</a:t>
+            </a:r>
+          </a:p>
+        </p:txBody>
+      </p:sp>
+      <p:pic>
+        <p:nvPicPr>
+          <p:cNvPr id="4" name="Picture 3" descr="Icon&#10;&#10;Description automatically generated">
+            <a:extLst>
+              <a:ext uri="{FF2B5EF4-FFF2-40B4-BE49-F238E27FC236}">
+                <a16:creationId xmlns:a16="http://schemas.microsoft.com/office/drawing/2014/main" id="{F0576113-1DC2-EC8D-5A7E-28A7B31040C4}"/>
+              </a:ext>
+            </a:extLst>
+          </p:cNvPr>
+          <p:cNvPicPr>
+            <a:picLocks noChangeAspect="1"/>
+          </p:cNvPicPr>
+          <p:nvPr/>
+        </p:nvPicPr>
+        <p:blipFill>
+          <a:blip r:embed="rId2">
+            <a:extLst>
+              <a:ext uri="{28A0092B-C50C-407E-A947-70E740481C1C}">
+                <a14:useLocalDpi xmlns:a14="http://schemas.microsoft.com/office/drawing/2010/main" val="0"/>
+              </a:ext>
+            </a:extLst>
+          </a:blip>
+          <a:stretch>
+            <a:fillRect/>
+          </a:stretch>
+        </p:blipFill>
+        <p:spPr>
+          <a:xfrm>
+            <a:off x="8750808" y="316992"/>
+            <a:ext cx="3200400" cy="3200400"/>
+          </a:xfrm>
+          <a:prstGeom prst="rect">
+            <a:avLst/>
+          </a:prstGeom>
+        </p:spPr>
+      </p:pic>
+    </p:spTree>
+    <p:extLst>
+      <p:ext uri="{BB962C8B-B14F-4D97-AF65-F5344CB8AC3E}">
+        <p14:creationId xmlns:p14="http://schemas.microsoft.com/office/powerpoint/2010/main" val="2785821167"/>
+      </p:ext>
+    </p:extLst>
+  </p:cSld>
+  <p:clrMapOvr>
+    <a:masterClrMapping/>
+  </p:clrMapOvr>
+</p:sld>
+</file>
+
+<file path=ppt/slides/slide9.xml><?xml version="1.0" encoding="utf-8"?>
+<p:sld xmlns:a="http://schemas.openxmlformats.org/drawingml/2006/main" xmlns:r="http://schemas.openxmlformats.org/officeDocument/2006/relationships" xmlns:p="http://schemas.openxmlformats.org/presentationml/2006/main" show="0">
+  <p:cSld>
+    <p:spTree>
+      <p:nvGrpSpPr>
+        <p:cNvPr id="1" name=""/>
+        <p:cNvGrpSpPr/>
+        <p:nvPr/>
+      </p:nvGrpSpPr>
+      <p:grpSpPr>
+        <a:xfrm>
+          <a:off x="0" y="0"/>
+          <a:ext cx="0" cy="0"/>
+          <a:chOff x="0" y="0"/>
+          <a:chExt cx="0" cy="0"/>
+        </a:xfrm>
+      </p:grpSpPr>
+      <p:sp>
+        <p:nvSpPr>
+          <p:cNvPr id="2" name="Title 1">
+            <a:extLst>
+              <a:ext uri="{FF2B5EF4-FFF2-40B4-BE49-F238E27FC236}">
                 <a16:creationId xmlns:a16="http://schemas.microsoft.com/office/drawing/2014/main" id="{BAA47C0F-A56F-7DC0-6438-0D855EEEE238}"/>
               </a:ext>
             </a:extLst>
@@ -7961,64 +8402,6 @@
     <p:extLst>
       <p:ext uri="{BB962C8B-B14F-4D97-AF65-F5344CB8AC3E}">
         <p14:creationId xmlns:p14="http://schemas.microsoft.com/office/powerpoint/2010/main" val="1385740257"/>
-      </p:ext>
-    </p:extLst>
-  </p:cSld>
-  <p:clrMapOvr>
-    <a:masterClrMapping/>
-  </p:clrMapOvr>
-</p:sld>
-</file>
-
-<file path=ppt/slides/slide9.xml><?xml version="1.0" encoding="utf-8"?>
-<p:sld xmlns:a="http://schemas.openxmlformats.org/drawingml/2006/main" xmlns:r="http://schemas.openxmlformats.org/officeDocument/2006/relationships" xmlns:p="http://schemas.openxmlformats.org/presentationml/2006/main">
-  <p:cSld>
-    <p:spTree>
-      <p:nvGrpSpPr>
-        <p:cNvPr id="1" name=""/>
-        <p:cNvGrpSpPr/>
-        <p:nvPr/>
-      </p:nvGrpSpPr>
-      <p:grpSpPr>
-        <a:xfrm>
-          <a:off x="0" y="0"/>
-          <a:ext cx="0" cy="0"/>
-          <a:chOff x="0" y="0"/>
-          <a:chExt cx="0" cy="0"/>
-        </a:xfrm>
-      </p:grpSpPr>
-      <p:sp>
-        <p:nvSpPr>
-          <p:cNvPr id="2" name="Title 1">
-            <a:extLst>
-              <a:ext uri="{FF2B5EF4-FFF2-40B4-BE49-F238E27FC236}">
-                <a16:creationId xmlns:a16="http://schemas.microsoft.com/office/drawing/2014/main" id="{0CBD8440-B870-F737-CD06-2E874A553E5D}"/>
-              </a:ext>
-            </a:extLst>
-          </p:cNvPr>
-          <p:cNvSpPr>
-            <a:spLocks noGrp="1"/>
-          </p:cNvSpPr>
-          <p:nvPr>
-            <p:ph type="title"/>
-          </p:nvPr>
-        </p:nvSpPr>
-        <p:spPr/>
-        <p:txBody>
-          <a:bodyPr/>
-          <a:lstStyle/>
-          <a:p>
-            <a:r>
-              <a:rPr lang="en-US" dirty="0"/>
-              <a:t>Practices for Managing Projects</a:t>
-            </a:r>
-          </a:p>
-        </p:txBody>
-      </p:sp>
-    </p:spTree>
-    <p:extLst>
-      <p:ext uri="{BB962C8B-B14F-4D97-AF65-F5344CB8AC3E}">
-        <p14:creationId xmlns:p14="http://schemas.microsoft.com/office/powerpoint/2010/main" val="2082267965"/>
       </p:ext>
     </p:extLst>
   </p:cSld>
@@ -9133,6 +9516,15 @@
 </file>
 
 <file path=customXml/item2.xml><?xml version="1.0" encoding="utf-8"?>
+<?mso-contentType ?>
+<FormTemplates xmlns="http://schemas.microsoft.com/sharepoint/v3/contenttype/forms">
+  <Display>DocumentLibraryForm</Display>
+  <Edit>DocumentLibraryForm</Edit>
+  <New>DocumentLibraryForm</New>
+</FormTemplates>
+</file>
+
+<file path=customXml/item3.xml><?xml version="1.0" encoding="utf-8"?>
 <p:properties xmlns:p="http://schemas.microsoft.com/office/2006/metadata/properties" xmlns:xsi="http://www.w3.org/2001/XMLSchema-instance" xmlns:pc="http://schemas.microsoft.com/office/infopath/2007/PartnerControls">
   <documentManagement>
     <TaxCatchAll xmlns="4aae6841-32d9-425b-8541-f9f698492036" xsi:nil="true"/>
@@ -9141,15 +9533,6 @@
     </lcf76f155ced4ddcb4097134ff3c332f>
   </documentManagement>
 </p:properties>
-</file>
-
-<file path=customXml/item3.xml><?xml version="1.0" encoding="utf-8"?>
-<?mso-contentType ?>
-<FormTemplates xmlns="http://schemas.microsoft.com/sharepoint/v3/contenttype/forms">
-  <Display>DocumentLibraryForm</Display>
-  <Edit>DocumentLibraryForm</Edit>
-  <New>DocumentLibraryForm</New>
-</FormTemplates>
 </file>
 
 <file path=customXml/itemProps1.xml><?xml version="1.0" encoding="utf-8"?>
@@ -9172,6 +9555,14 @@
 </file>
 
 <file path=customXml/itemProps2.xml><?xml version="1.0" encoding="utf-8"?>
+<ds:datastoreItem xmlns:ds="http://schemas.openxmlformats.org/officeDocument/2006/customXml" ds:itemID="{F6CC4A5B-1F75-4BD7-B163-149A0E183172}">
+  <ds:schemaRefs>
+    <ds:schemaRef ds:uri="http://schemas.microsoft.com/sharepoint/v3/contenttype/forms"/>
+  </ds:schemaRefs>
+</ds:datastoreItem>
+</file>
+
+<file path=customXml/itemProps3.xml><?xml version="1.0" encoding="utf-8"?>
 <ds:datastoreItem xmlns:ds="http://schemas.openxmlformats.org/officeDocument/2006/customXml" ds:itemID="{35FE530B-CE91-4BDF-8A4E-F23DF0423B91}">
   <ds:schemaRefs>
     <ds:schemaRef ds:uri="http://schemas.microsoft.com/office/2006/metadata/properties"/>
@@ -9186,12 +9577,4 @@
     <ds:schemaRef ds:uri="http://purl.org/dc/terms/"/>
   </ds:schemaRefs>
 </ds:datastoreItem>
-</file>
-
-<file path=customXml/itemProps3.xml><?xml version="1.0" encoding="utf-8"?>
-<ds:datastoreItem xmlns:ds="http://schemas.openxmlformats.org/officeDocument/2006/customXml" ds:itemID="{F6CC4A5B-1F75-4BD7-B163-149A0E183172}">
-  <ds:schemaRefs>
-    <ds:schemaRef ds:uri="http://schemas.microsoft.com/sharepoint/v3/contenttype/forms"/>
-  </ds:schemaRefs>
-</ds:datastoreItem>
 </file>
</xml_diff>